<commit_message>
New slides on template classes and some fixes for existing ones
git-svn-id: https://svn.code.sf.net/p/cpp-lects-rus/code/trunk@282 39143b06-f351-456c-9f92-4cd32fad6823
</commit_message>
<xml_diff>
--- a/slides/sep2017/16-algorithms.pptx
+++ b/slides/sep2017/16-algorithms.pptx
@@ -392,7 +392,7 @@
             <a:fld id="{96DFF08F-DC6B-4601-B491-B0F83F6DD2DA}" type="datetimeFigureOut">
               <a:rPr lang="en-US" dirty="0"/>
               <a:pPr/>
-              <a:t>4/25/2018</a:t>
+              <a:t>9/3/2018</a:t>
             </a:fld>
             <a:endParaRPr lang="en-US" dirty="0"/>
           </a:p>
@@ -609,7 +609,7 @@
           <a:p>
             <a:fld id="{96DFF08F-DC6B-4601-B491-B0F83F6DD2DA}" type="datetimeFigureOut">
               <a:rPr lang="en-US" dirty="0"/>
-              <a:t>4/25/2018</a:t>
+              <a:t>9/3/2018</a:t>
             </a:fld>
             <a:endParaRPr lang="en-US" dirty="0"/>
           </a:p>
@@ -784,7 +784,7 @@
           <a:p>
             <a:fld id="{96DFF08F-DC6B-4601-B491-B0F83F6DD2DA}" type="datetimeFigureOut">
               <a:rPr lang="en-US" dirty="0"/>
-              <a:t>4/25/2018</a:t>
+              <a:t>9/3/2018</a:t>
             </a:fld>
             <a:endParaRPr lang="en-US" dirty="0"/>
           </a:p>
@@ -949,7 +949,7 @@
           <a:p>
             <a:fld id="{96DFF08F-DC6B-4601-B491-B0F83F6DD2DA}" type="datetimeFigureOut">
               <a:rPr lang="en-US" dirty="0"/>
-              <a:t>4/25/2018</a:t>
+              <a:t>9/3/2018</a:t>
             </a:fld>
             <a:endParaRPr lang="en-US" dirty="0"/>
           </a:p>
@@ -1195,7 +1195,7 @@
           <a:p>
             <a:fld id="{96DFF08F-DC6B-4601-B491-B0F83F6DD2DA}" type="datetimeFigureOut">
               <a:rPr lang="en-US" dirty="0"/>
-              <a:t>4/25/2018</a:t>
+              <a:t>9/3/2018</a:t>
             </a:fld>
             <a:endParaRPr lang="en-US" dirty="0"/>
           </a:p>
@@ -1513,7 +1513,7 @@
           <a:p>
             <a:fld id="{96DFF08F-DC6B-4601-B491-B0F83F6DD2DA}" type="datetimeFigureOut">
               <a:rPr lang="en-US" dirty="0"/>
-              <a:t>4/25/2018</a:t>
+              <a:t>9/3/2018</a:t>
             </a:fld>
             <a:endParaRPr lang="en-US" dirty="0"/>
           </a:p>
@@ -1932,7 +1932,7 @@
           <a:p>
             <a:fld id="{96DFF08F-DC6B-4601-B491-B0F83F6DD2DA}" type="datetimeFigureOut">
               <a:rPr lang="en-US" dirty="0"/>
-              <a:t>4/25/2018</a:t>
+              <a:t>9/3/2018</a:t>
             </a:fld>
             <a:endParaRPr lang="en-US" dirty="0"/>
           </a:p>
@@ -2045,7 +2045,7 @@
           <a:p>
             <a:fld id="{96DFF08F-DC6B-4601-B491-B0F83F6DD2DA}" type="datetimeFigureOut">
               <a:rPr lang="en-US" dirty="0"/>
-              <a:t>4/25/2018</a:t>
+              <a:t>9/3/2018</a:t>
             </a:fld>
             <a:endParaRPr lang="en-US" dirty="0"/>
           </a:p>
@@ -2135,7 +2135,7 @@
           <a:p>
             <a:fld id="{96DFF08F-DC6B-4601-B491-B0F83F6DD2DA}" type="datetimeFigureOut">
               <a:rPr lang="en-US" dirty="0"/>
-              <a:t>4/25/2018</a:t>
+              <a:t>9/3/2018</a:t>
             </a:fld>
             <a:endParaRPr lang="en-US" dirty="0"/>
           </a:p>
@@ -2420,7 +2420,7 @@
           <a:p>
             <a:fld id="{96DFF08F-DC6B-4601-B491-B0F83F6DD2DA}" type="datetimeFigureOut">
               <a:rPr lang="en-US" dirty="0"/>
-              <a:t>4/25/2018</a:t>
+              <a:t>9/3/2018</a:t>
             </a:fld>
             <a:endParaRPr lang="en-US" dirty="0"/>
           </a:p>
@@ -2687,7 +2687,7 @@
           <a:p>
             <a:fld id="{96DFF08F-DC6B-4601-B491-B0F83F6DD2DA}" type="datetimeFigureOut">
               <a:rPr lang="en-US" dirty="0"/>
-              <a:t>4/25/2018</a:t>
+              <a:t>9/3/2018</a:t>
             </a:fld>
             <a:endParaRPr lang="en-US" dirty="0"/>
           </a:p>
@@ -2936,7 +2936,7 @@
             <a:fld id="{96DFF08F-DC6B-4601-B491-B0F83F6DD2DA}" type="datetimeFigureOut">
               <a:rPr lang="en-US" dirty="0"/>
               <a:pPr/>
-              <a:t>4/25/2018</a:t>
+              <a:t>9/3/2018</a:t>
             </a:fld>
             <a:endParaRPr lang="en-US" dirty="0"/>
           </a:p>
@@ -22118,13 +22118,7 @@
               <a:rPr lang="en-US" smtClean="0">
                 <a:latin typeface="Consolas" panose="020B0609020204030204" pitchFamily="49" charset="0"/>
               </a:rPr>
-              <a:t>       string </a:t>
-            </a:r>
-            <a:r>
-              <a:rPr lang="en-US" smtClean="0">
-                <a:latin typeface="Consolas" panose="020B0609020204030204" pitchFamily="49" charset="0"/>
-              </a:rPr>
-              <a:t>temp = de.path</a:t>
+              <a:t>       string temp = de.path</a:t>
             </a:r>
             <a:r>
               <a:rPr lang="en-US">
@@ -22598,13 +22592,7 @@
               <a:rPr lang="en-US" smtClean="0">
                 <a:latin typeface="Consolas" panose="020B0609020204030204" pitchFamily="49" charset="0"/>
               </a:rPr>
-              <a:t>       string </a:t>
-            </a:r>
-            <a:r>
-              <a:rPr lang="en-US" smtClean="0">
-                <a:latin typeface="Consolas" panose="020B0609020204030204" pitchFamily="49" charset="0"/>
-              </a:rPr>
-              <a:t>temp = de.path</a:t>
+              <a:t>       string temp = de.path</a:t>
             </a:r>
             <a:r>
               <a:rPr lang="en-US">
@@ -23552,19 +23540,7 @@
               <a:rPr lang="en-US" smtClean="0">
                 <a:latin typeface="Consolas" panose="020B0609020204030204" pitchFamily="49" charset="0"/>
               </a:rPr>
-              <a:t>if (binary_search (v.begin(), v.end(), 37</a:t>
-            </a:r>
-            <a:r>
-              <a:rPr lang="en-US" smtClean="0">
-                <a:latin typeface="Consolas" panose="020B0609020204030204" pitchFamily="49" charset="0"/>
-              </a:rPr>
-              <a:t>)) </a:t>
-            </a:r>
-            <a:r>
-              <a:rPr lang="en-US" smtClean="0">
-                <a:latin typeface="Consolas" panose="020B0609020204030204" pitchFamily="49" charset="0"/>
-              </a:rPr>
-              <a:t>{</a:t>
+              <a:t>if (binary_search (v.begin(), v.end(), 37)) {</a:t>
             </a:r>
           </a:p>
           <a:p>

</xml_diff>